<commit_message>
Adding all notes in review ppt
</commit_message>
<xml_diff>
--- a/Review.pptx
+++ b/Review.pptx
@@ -9,6 +9,8 @@
     <p:sldId id="258" r:id="rId3"/>
     <p:sldId id="259" r:id="rId4"/>
     <p:sldId id="260" r:id="rId5"/>
+    <p:sldId id="261" r:id="rId6"/>
+    <p:sldId id="262" r:id="rId7"/>
   </p:sldIdLst>
   <p:sldSz cx="12192000" cy="6858000"/>
   <p:notesSz cx="6858000" cy="9144000"/>
@@ -837,7 +839,7 @@
           <a:p>
             <a:fld id="{145DCDA5-49E9-8E45-B2B2-C84A7DB54DD9}" type="datetimeFigureOut">
               <a:rPr lang="en-US" smtClean="0"/>
-              <a:t>7/26/23</a:t>
+              <a:t>7/27/23</a:t>
             </a:fld>
             <a:endParaRPr lang="en-US"/>
           </a:p>
@@ -1088,7 +1090,7 @@
           <a:p>
             <a:fld id="{145DCDA5-49E9-8E45-B2B2-C84A7DB54DD9}" type="datetimeFigureOut">
               <a:rPr lang="en-US" smtClean="0"/>
-              <a:t>7/26/23</a:t>
+              <a:t>7/27/23</a:t>
             </a:fld>
             <a:endParaRPr lang="en-US"/>
           </a:p>
@@ -1402,7 +1404,7 @@
           <a:p>
             <a:fld id="{145DCDA5-49E9-8E45-B2B2-C84A7DB54DD9}" type="datetimeFigureOut">
               <a:rPr lang="en-US" smtClean="0"/>
-              <a:t>7/26/23</a:t>
+              <a:t>7/27/23</a:t>
             </a:fld>
             <a:endParaRPr lang="en-US"/>
           </a:p>
@@ -1743,7 +1745,7 @@
           <a:p>
             <a:fld id="{145DCDA5-49E9-8E45-B2B2-C84A7DB54DD9}" type="datetimeFigureOut">
               <a:rPr lang="en-US" smtClean="0"/>
-              <a:t>7/26/23</a:t>
+              <a:t>7/27/23</a:t>
             </a:fld>
             <a:endParaRPr lang="en-US"/>
           </a:p>
@@ -2057,7 +2059,7 @@
           <a:p>
             <a:fld id="{145DCDA5-49E9-8E45-B2B2-C84A7DB54DD9}" type="datetimeFigureOut">
               <a:rPr lang="en-US" smtClean="0"/>
-              <a:t>7/26/23</a:t>
+              <a:t>7/27/23</a:t>
             </a:fld>
             <a:endParaRPr lang="en-US"/>
           </a:p>
@@ -2450,7 +2452,7 @@
           <a:p>
             <a:fld id="{145DCDA5-49E9-8E45-B2B2-C84A7DB54DD9}" type="datetimeFigureOut">
               <a:rPr lang="en-US" smtClean="0"/>
-              <a:t>7/26/23</a:t>
+              <a:t>7/27/23</a:t>
             </a:fld>
             <a:endParaRPr lang="en-US"/>
           </a:p>
@@ -2620,7 +2622,7 @@
           <a:p>
             <a:fld id="{145DCDA5-49E9-8E45-B2B2-C84A7DB54DD9}" type="datetimeFigureOut">
               <a:rPr lang="en-US" smtClean="0"/>
-              <a:t>7/26/23</a:t>
+              <a:t>7/27/23</a:t>
             </a:fld>
             <a:endParaRPr lang="en-US"/>
           </a:p>
@@ -2800,7 +2802,7 @@
           <a:p>
             <a:fld id="{145DCDA5-49E9-8E45-B2B2-C84A7DB54DD9}" type="datetimeFigureOut">
               <a:rPr lang="en-US" smtClean="0"/>
-              <a:t>7/26/23</a:t>
+              <a:t>7/27/23</a:t>
             </a:fld>
             <a:endParaRPr lang="en-US"/>
           </a:p>
@@ -2976,7 +2978,7 @@
           <a:p>
             <a:fld id="{145DCDA5-49E9-8E45-B2B2-C84A7DB54DD9}" type="datetimeFigureOut">
               <a:rPr lang="en-US" smtClean="0"/>
-              <a:t>7/26/23</a:t>
+              <a:t>7/27/23</a:t>
             </a:fld>
             <a:endParaRPr lang="en-US"/>
           </a:p>
@@ -3223,7 +3225,7 @@
           <a:p>
             <a:fld id="{145DCDA5-49E9-8E45-B2B2-C84A7DB54DD9}" type="datetimeFigureOut">
               <a:rPr lang="en-US" smtClean="0"/>
-              <a:t>7/26/23</a:t>
+              <a:t>7/27/23</a:t>
             </a:fld>
             <a:endParaRPr lang="en-US"/>
           </a:p>
@@ -3455,7 +3457,7 @@
           <a:p>
             <a:fld id="{145DCDA5-49E9-8E45-B2B2-C84A7DB54DD9}" type="datetimeFigureOut">
               <a:rPr lang="en-US" smtClean="0"/>
-              <a:t>7/26/23</a:t>
+              <a:t>7/27/23</a:t>
             </a:fld>
             <a:endParaRPr lang="en-US"/>
           </a:p>
@@ -3829,7 +3831,7 @@
           <a:p>
             <a:fld id="{145DCDA5-49E9-8E45-B2B2-C84A7DB54DD9}" type="datetimeFigureOut">
               <a:rPr lang="en-US" smtClean="0"/>
-              <a:t>7/26/23</a:t>
+              <a:t>7/27/23</a:t>
             </a:fld>
             <a:endParaRPr lang="en-US"/>
           </a:p>
@@ -3952,7 +3954,7 @@
           <a:p>
             <a:fld id="{145DCDA5-49E9-8E45-B2B2-C84A7DB54DD9}" type="datetimeFigureOut">
               <a:rPr lang="en-US" smtClean="0"/>
-              <a:t>7/26/23</a:t>
+              <a:t>7/27/23</a:t>
             </a:fld>
             <a:endParaRPr lang="en-US"/>
           </a:p>
@@ -4047,7 +4049,7 @@
           <a:p>
             <a:fld id="{145DCDA5-49E9-8E45-B2B2-C84A7DB54DD9}" type="datetimeFigureOut">
               <a:rPr lang="en-US" smtClean="0"/>
-              <a:t>7/26/23</a:t>
+              <a:t>7/27/23</a:t>
             </a:fld>
             <a:endParaRPr lang="en-US"/>
           </a:p>
@@ -4302,7 +4304,7 @@
           <a:p>
             <a:fld id="{145DCDA5-49E9-8E45-B2B2-C84A7DB54DD9}" type="datetimeFigureOut">
               <a:rPr lang="en-US" smtClean="0"/>
-              <a:t>7/26/23</a:t>
+              <a:t>7/27/23</a:t>
             </a:fld>
             <a:endParaRPr lang="en-US"/>
           </a:p>
@@ -4565,7 +4567,7 @@
           <a:p>
             <a:fld id="{145DCDA5-49E9-8E45-B2B2-C84A7DB54DD9}" type="datetimeFigureOut">
               <a:rPr lang="en-US" smtClean="0"/>
-              <a:t>7/26/23</a:t>
+              <a:t>7/27/23</a:t>
             </a:fld>
             <a:endParaRPr lang="en-US"/>
           </a:p>
@@ -5308,7 +5310,7 @@
           <a:p>
             <a:fld id="{145DCDA5-49E9-8E45-B2B2-C84A7DB54DD9}" type="datetimeFigureOut">
               <a:rPr lang="en-US" smtClean="0"/>
-              <a:t>7/26/23</a:t>
+              <a:t>7/27/23</a:t>
             </a:fld>
             <a:endParaRPr lang="en-US"/>
           </a:p>
@@ -6468,6 +6470,399 @@
 </p:sld>
 </file>
 
+<file path=ppt/slides/slide5.xml><?xml version="1.0" encoding="utf-8"?>
+<p:sld xmlns:a="http://schemas.openxmlformats.org/drawingml/2006/main" xmlns:r="http://schemas.openxmlformats.org/officeDocument/2006/relationships" xmlns:p="http://schemas.openxmlformats.org/presentationml/2006/main">
+  <p:cSld>
+    <p:spTree>
+      <p:nvGrpSpPr>
+        <p:cNvPr id="1" name=""/>
+        <p:cNvGrpSpPr/>
+        <p:nvPr/>
+      </p:nvGrpSpPr>
+      <p:grpSpPr>
+        <a:xfrm>
+          <a:off x="0" y="0"/>
+          <a:ext cx="0" cy="0"/>
+          <a:chOff x="0" y="0"/>
+          <a:chExt cx="0" cy="0"/>
+        </a:xfrm>
+      </p:grpSpPr>
+      <p:sp>
+        <p:nvSpPr>
+          <p:cNvPr id="2" name="Title 1">
+            <a:extLst>
+              <a:ext uri="{FF2B5EF4-FFF2-40B4-BE49-F238E27FC236}">
+                <a16:creationId xmlns:a16="http://schemas.microsoft.com/office/drawing/2014/main" id="{3CF42C49-43BC-77A7-244D-41977209B3F7}"/>
+              </a:ext>
+            </a:extLst>
+          </p:cNvPr>
+          <p:cNvSpPr>
+            <a:spLocks noGrp="1"/>
+          </p:cNvSpPr>
+          <p:nvPr>
+            <p:ph type="title"/>
+          </p:nvPr>
+        </p:nvSpPr>
+        <p:spPr/>
+        <p:txBody>
+          <a:bodyPr/>
+          <a:lstStyle/>
+          <a:p>
+            <a:r>
+              <a:rPr lang="en-US" dirty="0"/>
+              <a:t>Steps</a:t>
+            </a:r>
+          </a:p>
+        </p:txBody>
+      </p:sp>
+      <p:sp>
+        <p:nvSpPr>
+          <p:cNvPr id="3" name="Content Placeholder 2">
+            <a:extLst>
+              <a:ext uri="{FF2B5EF4-FFF2-40B4-BE49-F238E27FC236}">
+                <a16:creationId xmlns:a16="http://schemas.microsoft.com/office/drawing/2014/main" id="{11B45351-887F-A0D6-E406-C945D146001F}"/>
+              </a:ext>
+            </a:extLst>
+          </p:cNvPr>
+          <p:cNvSpPr>
+            <a:spLocks noGrp="1"/>
+          </p:cNvSpPr>
+          <p:nvPr>
+            <p:ph idx="1"/>
+          </p:nvPr>
+        </p:nvSpPr>
+        <p:spPr>
+          <a:xfrm>
+            <a:off x="677334" y="1540478"/>
+            <a:ext cx="8596668" cy="4923383"/>
+          </a:xfrm>
+        </p:spPr>
+        <p:txBody>
+          <a:bodyPr>
+            <a:normAutofit fontScale="92500" lnSpcReduction="10000"/>
+          </a:bodyPr>
+          <a:lstStyle/>
+          <a:p>
+            <a:r>
+              <a:rPr lang="en-US" dirty="0"/>
+              <a:t>1. Install packages</a:t>
+            </a:r>
+          </a:p>
+          <a:p>
+            <a:pPr lvl="1"/>
+            <a:r>
+              <a:rPr lang="en-US" dirty="0" err="1"/>
+              <a:t>i</a:t>
+            </a:r>
+            <a:r>
+              <a:rPr lang="en-US" dirty="0"/>
+              <a:t>. Tell it to use </a:t>
+            </a:r>
+            <a:r>
+              <a:rPr lang="en-US" dirty="0" err="1"/>
+              <a:t>pylab</a:t>
+            </a:r>
+            <a:r>
+              <a:rPr lang="en-US" dirty="0"/>
+              <a:t> too</a:t>
+            </a:r>
+          </a:p>
+          <a:p>
+            <a:r>
+              <a:rPr lang="en-US" dirty="0"/>
+              <a:t>2. Pick an event</a:t>
+            </a:r>
+          </a:p>
+          <a:p>
+            <a:pPr lvl="1"/>
+            <a:r>
+              <a:rPr lang="en-US" dirty="0" err="1"/>
+              <a:t>i</a:t>
+            </a:r>
+            <a:r>
+              <a:rPr lang="en-US" dirty="0"/>
+              <a:t>. </a:t>
+            </a:r>
+            <a:r>
+              <a:rPr lang="en-US" dirty="0">
+                <a:hlinkClick r:id="rId2"/>
+              </a:rPr>
+              <a:t>https://gwosc.org/eventapi/html/allevents/</a:t>
+            </a:r>
+            <a:endParaRPr lang="en-US" dirty="0"/>
+          </a:p>
+          <a:p>
+            <a:r>
+              <a:rPr lang="en-US" dirty="0"/>
+              <a:t>3. “Condition”: </a:t>
+            </a:r>
+            <a:r>
+              <a:rPr lang="en-US" dirty="0" err="1"/>
+              <a:t>highpass</a:t>
+            </a:r>
+            <a:r>
+              <a:rPr lang="en-US" dirty="0"/>
+              <a:t>, resample, crop</a:t>
+            </a:r>
+          </a:p>
+          <a:p>
+            <a:pPr lvl="1"/>
+            <a:r>
+              <a:rPr lang="en-US" dirty="0" err="1"/>
+              <a:t>i</a:t>
+            </a:r>
+            <a:r>
+              <a:rPr lang="en-US" dirty="0"/>
+              <a:t>. Make PSD, interpolate, truncate</a:t>
+            </a:r>
+          </a:p>
+          <a:p>
+            <a:r>
+              <a:rPr lang="en-US" dirty="0"/>
+              <a:t>4. Generate waveform template</a:t>
+            </a:r>
+          </a:p>
+          <a:p>
+            <a:pPr lvl="1"/>
+            <a:r>
+              <a:rPr lang="en-US" dirty="0" err="1"/>
+              <a:t>i</a:t>
+            </a:r>
+            <a:r>
+              <a:rPr lang="en-US" dirty="0"/>
+              <a:t>. Get masses and distance from GWOSC</a:t>
+            </a:r>
+          </a:p>
+          <a:p>
+            <a:pPr lvl="1"/>
+            <a:r>
+              <a:rPr lang="en-US" dirty="0"/>
+              <a:t>ii. Resize</a:t>
+            </a:r>
+          </a:p>
+          <a:p>
+            <a:pPr lvl="1"/>
+            <a:r>
+              <a:rPr lang="en-US" dirty="0"/>
+              <a:t>iii. Cyclic time shift</a:t>
+            </a:r>
+          </a:p>
+          <a:p>
+            <a:r>
+              <a:rPr lang="en-US" dirty="0"/>
+              <a:t>5. Matched filter</a:t>
+            </a:r>
+          </a:p>
+          <a:p>
+            <a:pPr lvl="1"/>
+            <a:r>
+              <a:rPr lang="en-US" dirty="0" err="1"/>
+              <a:t>i</a:t>
+            </a:r>
+            <a:r>
+              <a:rPr lang="en-US" dirty="0"/>
+              <a:t>. Crop</a:t>
+            </a:r>
+          </a:p>
+          <a:p>
+            <a:r>
+              <a:rPr lang="en-US" dirty="0"/>
+              <a:t>6. Plot and get peak SNR to make a detection!</a:t>
+            </a:r>
+          </a:p>
+          <a:p>
+            <a:r>
+              <a:rPr lang="en-US" dirty="0"/>
+              <a:t>7. [Optional] Plot data and model to see how well they match</a:t>
+            </a:r>
+          </a:p>
+          <a:p>
+            <a:endParaRPr lang="en-US" dirty="0"/>
+          </a:p>
+        </p:txBody>
+      </p:sp>
+    </p:spTree>
+    <p:extLst>
+      <p:ext uri="{BB962C8B-B14F-4D97-AF65-F5344CB8AC3E}">
+        <p14:creationId xmlns:p14="http://schemas.microsoft.com/office/powerpoint/2010/main" val="3804975460"/>
+      </p:ext>
+    </p:extLst>
+  </p:cSld>
+  <p:clrMapOvr>
+    <a:masterClrMapping/>
+  </p:clrMapOvr>
+</p:sld>
+</file>
+
+<file path=ppt/slides/slide6.xml><?xml version="1.0" encoding="utf-8"?>
+<p:sld xmlns:a="http://schemas.openxmlformats.org/drawingml/2006/main" xmlns:r="http://schemas.openxmlformats.org/officeDocument/2006/relationships" xmlns:p="http://schemas.openxmlformats.org/presentationml/2006/main">
+  <p:cSld>
+    <p:spTree>
+      <p:nvGrpSpPr>
+        <p:cNvPr id="1" name=""/>
+        <p:cNvGrpSpPr/>
+        <p:nvPr/>
+      </p:nvGrpSpPr>
+      <p:grpSpPr>
+        <a:xfrm>
+          <a:off x="0" y="0"/>
+          <a:ext cx="0" cy="0"/>
+          <a:chOff x="0" y="0"/>
+          <a:chExt cx="0" cy="0"/>
+        </a:xfrm>
+      </p:grpSpPr>
+      <p:sp>
+        <p:nvSpPr>
+          <p:cNvPr id="2" name="Title 1">
+            <a:extLst>
+              <a:ext uri="{FF2B5EF4-FFF2-40B4-BE49-F238E27FC236}">
+                <a16:creationId xmlns:a16="http://schemas.microsoft.com/office/drawing/2014/main" id="{3CF42C49-43BC-77A7-244D-41977209B3F7}"/>
+              </a:ext>
+            </a:extLst>
+          </p:cNvPr>
+          <p:cNvSpPr>
+            <a:spLocks noGrp="1"/>
+          </p:cNvSpPr>
+          <p:nvPr>
+            <p:ph type="title"/>
+          </p:nvPr>
+        </p:nvSpPr>
+        <p:spPr/>
+        <p:txBody>
+          <a:bodyPr/>
+          <a:lstStyle/>
+          <a:p>
+            <a:r>
+              <a:rPr lang="en-US" dirty="0"/>
+              <a:t>Presentation Outline</a:t>
+            </a:r>
+          </a:p>
+        </p:txBody>
+      </p:sp>
+      <p:sp>
+        <p:nvSpPr>
+          <p:cNvPr id="3" name="Content Placeholder 2">
+            <a:extLst>
+              <a:ext uri="{FF2B5EF4-FFF2-40B4-BE49-F238E27FC236}">
+                <a16:creationId xmlns:a16="http://schemas.microsoft.com/office/drawing/2014/main" id="{11B45351-887F-A0D6-E406-C945D146001F}"/>
+              </a:ext>
+            </a:extLst>
+          </p:cNvPr>
+          <p:cNvSpPr>
+            <a:spLocks noGrp="1"/>
+          </p:cNvSpPr>
+          <p:nvPr>
+            <p:ph idx="1"/>
+          </p:nvPr>
+        </p:nvSpPr>
+        <p:spPr>
+          <a:xfrm>
+            <a:off x="677334" y="1540478"/>
+            <a:ext cx="8596668" cy="4923383"/>
+          </a:xfrm>
+        </p:spPr>
+        <p:txBody>
+          <a:bodyPr>
+            <a:normAutofit/>
+          </a:bodyPr>
+          <a:lstStyle/>
+          <a:p>
+            <a:r>
+              <a:rPr lang="en-US" dirty="0"/>
+              <a:t>Intro: Ryan</a:t>
+            </a:r>
+          </a:p>
+          <a:p>
+            <a:pPr lvl="1"/>
+            <a:r>
+              <a:rPr lang="en-US" dirty="0"/>
+              <a:t>Waves and gravity, EM vs GR</a:t>
+            </a:r>
+          </a:p>
+          <a:p>
+            <a:pPr lvl="1"/>
+            <a:r>
+              <a:rPr lang="en-US" dirty="0"/>
+              <a:t>Black holes interacting, making waves</a:t>
+            </a:r>
+          </a:p>
+          <a:p>
+            <a:pPr lvl="1"/>
+            <a:r>
+              <a:rPr lang="en-US" dirty="0"/>
+              <a:t>LIGO detectors and history</a:t>
+            </a:r>
+          </a:p>
+          <a:p>
+            <a:r>
+              <a:rPr lang="en-US" dirty="0"/>
+              <a:t>Waves and gravity: Ryan</a:t>
+            </a:r>
+          </a:p>
+          <a:p>
+            <a:r>
+              <a:rPr lang="en-US" dirty="0"/>
+              <a:t>Black holes: Aaron</a:t>
+            </a:r>
+          </a:p>
+          <a:p>
+            <a:r>
+              <a:rPr lang="en-US" dirty="0"/>
+              <a:t>LIGO: </a:t>
+            </a:r>
+            <a:r>
+              <a:rPr lang="en-US" dirty="0" err="1"/>
+              <a:t>Clarisa</a:t>
+            </a:r>
+            <a:endParaRPr lang="en-US" dirty="0"/>
+          </a:p>
+          <a:p>
+            <a:pPr lvl="1"/>
+            <a:r>
+              <a:rPr lang="en-US" dirty="0"/>
+              <a:t>Public data</a:t>
+            </a:r>
+          </a:p>
+          <a:p>
+            <a:r>
+              <a:rPr lang="en-US" dirty="0"/>
+              <a:t>Python programming: Joel</a:t>
+            </a:r>
+          </a:p>
+          <a:p>
+            <a:pPr lvl="1"/>
+            <a:r>
+              <a:rPr lang="en-US" dirty="0"/>
+              <a:t>What is important</a:t>
+            </a:r>
+          </a:p>
+          <a:p>
+            <a:r>
+              <a:rPr lang="en-US" dirty="0"/>
+              <a:t>Why do we care: Matt</a:t>
+            </a:r>
+          </a:p>
+          <a:p>
+            <a:r>
+              <a:rPr lang="en-US" dirty="0"/>
+              <a:t>Conclusion: Matt</a:t>
+            </a:r>
+          </a:p>
+        </p:txBody>
+      </p:sp>
+    </p:spTree>
+    <p:extLst>
+      <p:ext uri="{BB962C8B-B14F-4D97-AF65-F5344CB8AC3E}">
+        <p14:creationId xmlns:p14="http://schemas.microsoft.com/office/powerpoint/2010/main" val="3727291913"/>
+      </p:ext>
+    </p:extLst>
+  </p:cSld>
+  <p:clrMapOvr>
+    <a:masterClrMapping/>
+  </p:clrMapOvr>
+</p:sld>
+</file>
+
 <file path=ppt/theme/theme1.xml><?xml version="1.0" encoding="utf-8"?>
 <a:theme xmlns:a="http://schemas.openxmlformats.org/drawingml/2006/main" name="Facet">
   <a:themeElements>

</xml_diff>